<commit_message>
poster terminado - detalhes finais
</commit_message>
<xml_diff>
--- a/doc/Poster_Smart4Finances_ESTG.pptx
+++ b/doc/Poster_Smart4Finances_ESTG.pptx
@@ -3455,7 +3455,7 @@
         </p:nvSpPr>
         <p:spPr bwMode="auto">
           <a:xfrm>
-            <a:off x="4190228" y="1224735"/>
+            <a:off x="4175307" y="1233049"/>
             <a:ext cx="4672607" cy="7320280"/>
           </a:xfrm>
           <a:prstGeom prst="roundRect">
@@ -4153,8 +4153,8 @@
         </p:nvSpPr>
         <p:spPr>
           <a:xfrm>
-            <a:off x="153294" y="1344216"/>
-            <a:ext cx="3799234" cy="2185214"/>
+            <a:off x="113789" y="1343552"/>
+            <a:ext cx="3923186" cy="1892826"/>
           </a:xfrm>
           <a:prstGeom prst="rect">
             <a:avLst/>
@@ -4184,18 +4184,18 @@
           <a:p>
             <a:pPr algn="just"/>
             <a:r>
-              <a:rPr lang="pt-PT" sz="1200" dirty="0"/>
+              <a:rPr lang="pt-PT" sz="1100" dirty="0"/>
               <a:t>O</a:t>
             </a:r>
             <a:r>
-              <a:rPr lang="pt-PT" sz="1200" b="1" dirty="0"/>
+              <a:rPr lang="pt-PT" sz="1100" b="1" dirty="0"/>
               <a:t> Smart4Finances</a:t>
             </a:r>
             <a:r>
-              <a:rPr lang="pt-PT" sz="1200" dirty="0"/>
+              <a:rPr lang="pt-PT" sz="1100" dirty="0"/>
               <a:t> é uma aplicação web desenvolvida no âmbito da Licenciatura em Engenharia Informática que permite aos utilizadores gerir os seus rendimentos, despesas e investimentos. Com dashboards interativos e relatórios detalhados, a plataforma promove a literacia financeira e ajuda na tomada de decisões mais informadas sobre finanças pessoais.</a:t>
             </a:r>
-            <a:endParaRPr lang="pt-PT" sz="1050" dirty="0">
+            <a:endParaRPr lang="pt-PT" sz="1000" dirty="0">
               <a:solidFill>
                 <a:srgbClr val="DDAB28"/>
               </a:solidFill>
@@ -4224,8 +4224,8 @@
         </p:nvSpPr>
         <p:spPr>
           <a:xfrm>
-            <a:off x="129357" y="3270474"/>
-            <a:ext cx="3652937" cy="400110"/>
+            <a:off x="130420" y="3005546"/>
+            <a:ext cx="3906555" cy="3493264"/>
           </a:xfrm>
           <a:prstGeom prst="rect">
             <a:avLst/>
@@ -4246,6 +4246,67 @@
               </a:rPr>
               <a:t>Objetivos</a:t>
             </a:r>
+          </a:p>
+          <a:p>
+            <a:pPr marL="171450" indent="-171450" algn="just">
+              <a:buFont typeface="Arial" panose="020B0604020202020204" pitchFamily="34" charset="0"/>
+              <a:buChar char="•"/>
+            </a:pPr>
+            <a:r>
+              <a:rPr lang="pt-PT" sz="1100" dirty="0"/>
+              <a:t>Realizar pesquisa e testes detalhados sobre plataformas digitais de gestão financeira e identificar as principais funcionalidades e vulnerabilidades.</a:t>
+            </a:r>
+          </a:p>
+          <a:p>
+            <a:pPr marL="171450" indent="-171450" algn="just">
+              <a:buFont typeface="Arial" panose="020B0604020202020204" pitchFamily="34" charset="0"/>
+              <a:buChar char="•"/>
+            </a:pPr>
+            <a:r>
+              <a:rPr lang="pt-PT" sz="1100" dirty="0"/>
+              <a:t>Capturar e apresentar informações estatísticas sobre hábitos financeiros, poupança e investimento da população portuguesa.</a:t>
+            </a:r>
+          </a:p>
+          <a:p>
+            <a:pPr marL="171450" indent="-171450" algn="just">
+              <a:buFont typeface="Arial" panose="020B0604020202020204" pitchFamily="34" charset="0"/>
+              <a:buChar char="•"/>
+            </a:pPr>
+            <a:r>
+              <a:rPr lang="pt-PT" sz="1100" dirty="0"/>
+              <a:t>Desenvolver uma solução automatizada e intuitiva para recolha, organização e visualização das informações financeiras pessoais dos utilizadores.</a:t>
+            </a:r>
+          </a:p>
+          <a:p>
+            <a:pPr marL="171450" indent="-171450" algn="just">
+              <a:buFont typeface="Arial" panose="020B0604020202020204" pitchFamily="34" charset="0"/>
+              <a:buChar char="•"/>
+            </a:pPr>
+            <a:r>
+              <a:rPr lang="pt-PT" sz="1100" dirty="0"/>
+              <a:t>Implementar ferramentas inteligentes e automáticas para alertas financeiros, como limites de gastos mensais e notificações personalizadas sobre despesas.</a:t>
+            </a:r>
+          </a:p>
+          <a:p>
+            <a:pPr marL="171450" indent="-171450" algn="just">
+              <a:buFont typeface="Arial" panose="020B0604020202020204" pitchFamily="34" charset="0"/>
+              <a:buChar char="•"/>
+            </a:pPr>
+            <a:r>
+              <a:rPr lang="pt-PT" sz="1100" dirty="0"/>
+              <a:t>Construir uma plataforma web segura, acessível e responsiva que permita aos utilizadores gerir as suas finanças pessoais, proporcionando maior controlo e literacia financeira.</a:t>
+            </a:r>
+          </a:p>
+          <a:p>
+            <a:r>
+              <a:rPr lang="pt-PT" dirty="0"/>
+              <a:t> </a:t>
+            </a:r>
+            <a:endParaRPr lang="pt-PT" sz="2000" dirty="0">
+              <a:solidFill>
+                <a:srgbClr val="DDAB28"/>
+              </a:solidFill>
+            </a:endParaRPr>
           </a:p>
         </p:txBody>
       </p:sp>
@@ -4264,7 +4325,7 @@
         <p:spPr>
           <a:xfrm>
             <a:off x="4187990" y="1343552"/>
-            <a:ext cx="3652937" cy="400110"/>
+            <a:ext cx="4672607" cy="4770537"/>
           </a:xfrm>
           <a:prstGeom prst="rect">
             <a:avLst/>
@@ -4285,6 +4346,177 @@
               </a:rPr>
               <a:t>Arquitetura da Solução</a:t>
             </a:r>
+          </a:p>
+          <a:p>
+            <a:pPr marL="171450" indent="-171450">
+              <a:buFont typeface="Arial" panose="020B0604020202020204" pitchFamily="34" charset="0"/>
+              <a:buChar char="•"/>
+            </a:pPr>
+            <a:r>
+              <a:rPr lang="pt-PT" sz="1100" dirty="0"/>
+              <a:t>Foi desenvolvida uma arquitetura web robusta estruturada em três camadas principais: </a:t>
+            </a:r>
+          </a:p>
+          <a:p>
+            <a:pPr marL="628650" lvl="1" indent="-171450">
+              <a:buFont typeface="Arial" panose="020B0604020202020204" pitchFamily="34" charset="0"/>
+              <a:buChar char="•"/>
+            </a:pPr>
+            <a:r>
+              <a:rPr lang="pt-PT" sz="1100" b="1" dirty="0" err="1"/>
+              <a:t>Frontend</a:t>
+            </a:r>
+            <a:r>
+              <a:rPr lang="pt-PT" sz="1100" b="1" dirty="0"/>
+              <a:t>:</a:t>
+            </a:r>
+            <a:r>
+              <a:rPr lang="pt-PT" sz="1100" dirty="0"/>
+              <a:t> Recorrendo a </a:t>
+            </a:r>
+            <a:r>
+              <a:rPr lang="pt-PT" sz="1100" dirty="0" err="1"/>
+              <a:t>Vue.js</a:t>
+            </a:r>
+            <a:r>
+              <a:rPr lang="pt-PT" sz="1100" dirty="0"/>
+              <a:t> para criar uma interface responsiva, dinâmica e centrada no utilizador, proporcionando uma experiência fluida em dispositivos móveis e desktop.</a:t>
+            </a:r>
+          </a:p>
+          <a:p>
+            <a:pPr marL="628650" lvl="1" indent="-171450">
+              <a:buFont typeface="Arial" panose="020B0604020202020204" pitchFamily="34" charset="0"/>
+              <a:buChar char="•"/>
+            </a:pPr>
+            <a:r>
+              <a:rPr lang="pt-PT" sz="1100" b="1" dirty="0" err="1"/>
+              <a:t>Backend</a:t>
+            </a:r>
+            <a:r>
+              <a:rPr lang="pt-PT" sz="1100" b="1" dirty="0"/>
+              <a:t>:</a:t>
+            </a:r>
+            <a:r>
+              <a:rPr lang="pt-PT" sz="1100" dirty="0"/>
+              <a:t> Foi implementada em </a:t>
+            </a:r>
+            <a:r>
+              <a:rPr lang="pt-PT" sz="1100" dirty="0" err="1"/>
+              <a:t>Laravel</a:t>
+            </a:r>
+            <a:r>
+              <a:rPr lang="pt-PT" sz="1100" dirty="0"/>
+              <a:t> para garantir segurança, gestão de lógica de negócio, autenticação eficiente (</a:t>
+            </a:r>
+            <a:r>
+              <a:rPr lang="pt-PT" sz="1100" dirty="0" err="1"/>
+              <a:t>Laravel</a:t>
+            </a:r>
+            <a:r>
+              <a:rPr lang="pt-PT" sz="1100" dirty="0"/>
+              <a:t> </a:t>
+            </a:r>
+            <a:r>
+              <a:rPr lang="pt-PT" sz="1100" dirty="0" err="1"/>
+              <a:t>Passport</a:t>
+            </a:r>
+            <a:r>
+              <a:rPr lang="pt-PT" sz="1100" dirty="0"/>
+              <a:t>), e integração facilitada com </a:t>
+            </a:r>
+            <a:r>
+              <a:rPr lang="pt-PT" sz="1100" dirty="0" err="1"/>
+              <a:t>APIs</a:t>
+            </a:r>
+            <a:r>
+              <a:rPr lang="pt-PT" sz="1100" dirty="0"/>
+              <a:t> externas e serviços adicionais (SMTP para notificações).</a:t>
+            </a:r>
+          </a:p>
+          <a:p>
+            <a:pPr marL="628650" lvl="1" indent="-171450">
+              <a:buFont typeface="Arial" panose="020B0604020202020204" pitchFamily="34" charset="0"/>
+              <a:buChar char="•"/>
+            </a:pPr>
+            <a:r>
+              <a:rPr lang="pt-PT" sz="1100" b="1" dirty="0"/>
+              <a:t>Base de Dados:</a:t>
+            </a:r>
+            <a:r>
+              <a:rPr lang="pt-PT" sz="1100" dirty="0"/>
+              <a:t> Foi </a:t>
+            </a:r>
+            <a:r>
+              <a:rPr lang="pt-PT" sz="1100" dirty="0" err="1"/>
+              <a:t>otimizizada</a:t>
+            </a:r>
+            <a:r>
+              <a:rPr lang="pt-PT" sz="1100" dirty="0"/>
+              <a:t> a BD </a:t>
+            </a:r>
+            <a:r>
+              <a:rPr lang="pt-PT" sz="1100" dirty="0" err="1"/>
+              <a:t>MySQL</a:t>
+            </a:r>
+            <a:r>
+              <a:rPr lang="pt-PT" sz="1100" dirty="0"/>
+              <a:t> para armazenamento eficaz e seguro, com elevada performance na manipulação de grandes volumes de dados financeiros.</a:t>
+            </a:r>
+          </a:p>
+          <a:p>
+            <a:pPr marL="171450" indent="-171450">
+              <a:buFont typeface="Arial" panose="020B0604020202020204" pitchFamily="34" charset="0"/>
+              <a:buChar char="•"/>
+            </a:pPr>
+            <a:r>
+              <a:rPr lang="pt-PT" sz="1100" dirty="0"/>
+              <a:t>Garantimos a segurança rigorosa através de mecanismos de autenticação robustos, prevenção de vulnerabilidades (CSRF, SQL </a:t>
+            </a:r>
+            <a:r>
+              <a:rPr lang="pt-PT" sz="1100" dirty="0" err="1"/>
+              <a:t>Injection</a:t>
+            </a:r>
+            <a:r>
+              <a:rPr lang="pt-PT" sz="1100" dirty="0"/>
+              <a:t>, XSS) e protocolos seguros de comunicação entre camadas.</a:t>
+            </a:r>
+          </a:p>
+          <a:p>
+            <a:pPr marL="171450" indent="-171450">
+              <a:buFont typeface="Arial" panose="020B0604020202020204" pitchFamily="34" charset="0"/>
+              <a:buChar char="•"/>
+            </a:pPr>
+            <a:r>
+              <a:rPr lang="pt-PT" sz="1100" dirty="0"/>
+              <a:t>Foi desenvolvida uma API REST intuitiva e bem documentada, permitindo integração simples com outros sistemas e aplicações móveis futuras.</a:t>
+            </a:r>
+          </a:p>
+          <a:p>
+            <a:pPr marL="171450" indent="-171450">
+              <a:buFont typeface="Arial" panose="020B0604020202020204" pitchFamily="34" charset="0"/>
+              <a:buChar char="•"/>
+            </a:pPr>
+            <a:r>
+              <a:rPr lang="pt-PT" sz="1100" dirty="0"/>
+              <a:t>Foi preparada a arquitetura para escalabilidade horizontal e vertical, permitindo expansão fácil, manutenção simplificada e adição de novas funcionalidades sem comprometer o desempenho.</a:t>
+            </a:r>
+          </a:p>
+          <a:p>
+            <a:pPr marL="171450" indent="-171450">
+              <a:buFont typeface="Arial" panose="020B0604020202020204" pitchFamily="34" charset="0"/>
+              <a:buChar char="•"/>
+            </a:pPr>
+            <a:r>
+              <a:rPr lang="pt-PT" sz="1100" dirty="0"/>
+              <a:t>Foi assegurada a modularidade e clareza no código, possibilitando colaboração eficaz entre membros da equipa e continuidade do desenvolvimento por futuras equipas.</a:t>
+            </a:r>
+          </a:p>
+          <a:p>
+            <a:endParaRPr lang="pt-PT" sz="2000" dirty="0">
+              <a:solidFill>
+                <a:srgbClr val="DDAB28"/>
+              </a:solidFill>
+            </a:endParaRPr>
           </a:p>
         </p:txBody>
       </p:sp>
@@ -4302,8 +4534,8 @@
         </p:nvSpPr>
         <p:spPr>
           <a:xfrm>
-            <a:off x="134814" y="5857621"/>
-            <a:ext cx="3652937" cy="400110"/>
+            <a:off x="130420" y="6283199"/>
+            <a:ext cx="3083078" cy="2569934"/>
           </a:xfrm>
           <a:prstGeom prst="rect">
             <a:avLst/>
@@ -4324,6 +4556,111 @@
               </a:rPr>
               <a:t>Arquitetura Proposta</a:t>
             </a:r>
+          </a:p>
+          <a:p>
+            <a:pPr marL="171450" indent="-171450" algn="just">
+              <a:buFont typeface="Arial" panose="020B0604020202020204" pitchFamily="34" charset="0"/>
+              <a:buChar char="•"/>
+            </a:pPr>
+            <a:r>
+              <a:rPr lang="pt-PT" sz="1100" dirty="0"/>
+              <a:t>Arquitetura escalável em três camadas (</a:t>
+            </a:r>
+            <a:r>
+              <a:rPr lang="pt-PT" sz="1100" dirty="0" err="1"/>
+              <a:t>Frontend</a:t>
+            </a:r>
+            <a:r>
+              <a:rPr lang="pt-PT" sz="1100" dirty="0"/>
+              <a:t> </a:t>
+            </a:r>
+            <a:r>
+              <a:rPr lang="pt-PT" sz="1100" dirty="0" err="1"/>
+              <a:t>Vue.js</a:t>
+            </a:r>
+            <a:r>
+              <a:rPr lang="pt-PT" sz="1100" dirty="0"/>
+              <a:t>, </a:t>
+            </a:r>
+            <a:r>
+              <a:rPr lang="pt-PT" sz="1100" dirty="0" err="1"/>
+              <a:t>Backend</a:t>
+            </a:r>
+            <a:r>
+              <a:rPr lang="pt-PT" sz="1100" dirty="0"/>
+              <a:t> </a:t>
+            </a:r>
+            <a:r>
+              <a:rPr lang="pt-PT" sz="1100" dirty="0" err="1"/>
+              <a:t>Laravel</a:t>
+            </a:r>
+            <a:r>
+              <a:rPr lang="pt-PT" sz="1100" dirty="0"/>
+              <a:t>, BD </a:t>
+            </a:r>
+            <a:r>
+              <a:rPr lang="pt-PT" sz="1100" dirty="0" err="1"/>
+              <a:t>MySQL</a:t>
+            </a:r>
+            <a:r>
+              <a:rPr lang="pt-PT" sz="1100" dirty="0"/>
+              <a:t>).</a:t>
+            </a:r>
+          </a:p>
+          <a:p>
+            <a:pPr marL="171450" indent="-171450" algn="just">
+              <a:buFont typeface="Arial" panose="020B0604020202020204" pitchFamily="34" charset="0"/>
+              <a:buChar char="•"/>
+            </a:pPr>
+            <a:r>
+              <a:rPr lang="pt-PT" sz="1100" dirty="0"/>
+              <a:t>Garantir a comunicação segura e eficiente via API REST com autenticação robusta.</a:t>
+            </a:r>
+          </a:p>
+          <a:p>
+            <a:pPr marL="171450" indent="-171450" algn="just">
+              <a:buFont typeface="Arial" panose="020B0604020202020204" pitchFamily="34" charset="0"/>
+              <a:buChar char="•"/>
+            </a:pPr>
+            <a:r>
+              <a:rPr lang="pt-PT" sz="1100" dirty="0"/>
+              <a:t>Implementar interface responsiva e amigável com </a:t>
+            </a:r>
+            <a:r>
+              <a:rPr lang="pt-PT" sz="1100" dirty="0" err="1"/>
+              <a:t>Vue.js</a:t>
+            </a:r>
+            <a:r>
+              <a:rPr lang="pt-PT" sz="1100" dirty="0"/>
+              <a:t>.</a:t>
+            </a:r>
+          </a:p>
+          <a:p>
+            <a:pPr marL="171450" indent="-171450" algn="just">
+              <a:buFont typeface="Arial" panose="020B0604020202020204" pitchFamily="34" charset="0"/>
+              <a:buChar char="•"/>
+            </a:pPr>
+            <a:r>
+              <a:rPr lang="pt-PT" sz="1100" dirty="0"/>
+              <a:t>Otimizar desempenho e segurança da base de dados.</a:t>
+            </a:r>
+          </a:p>
+          <a:p>
+            <a:pPr marL="171450" indent="-171450" algn="just">
+              <a:buFont typeface="Arial" panose="020B0604020202020204" pitchFamily="34" charset="0"/>
+              <a:buChar char="•"/>
+            </a:pPr>
+            <a:r>
+              <a:rPr lang="pt-PT" sz="1100" dirty="0"/>
+              <a:t>Permitir fácil manutenção e expansão futura.</a:t>
+            </a:r>
+          </a:p>
+          <a:p>
+            <a:endParaRPr lang="pt-PT" sz="2000" dirty="0">
+              <a:solidFill>
+                <a:srgbClr val="DDAB28"/>
+              </a:solidFill>
+            </a:endParaRPr>
           </a:p>
         </p:txBody>
       </p:sp>
@@ -4342,7 +4679,7 @@
         <p:spPr>
           <a:xfrm>
             <a:off x="9073419" y="1343552"/>
-            <a:ext cx="3652937" cy="400110"/>
+            <a:ext cx="3593367" cy="2569934"/>
           </a:xfrm>
           <a:prstGeom prst="rect">
             <a:avLst/>
@@ -4363,6 +4700,79 @@
               </a:rPr>
               <a:t>Resultados Obtidos</a:t>
             </a:r>
+          </a:p>
+          <a:p>
+            <a:pPr marL="171450" indent="-171450" algn="just">
+              <a:buFont typeface="Arial" panose="020B0604020202020204" pitchFamily="34" charset="0"/>
+              <a:buChar char="•"/>
+            </a:pPr>
+            <a:r>
+              <a:rPr lang="pt-PT" sz="1100" dirty="0"/>
+              <a:t>Desenvolvimento </a:t>
+            </a:r>
+            <a:r>
+              <a:rPr lang="pt-PT" sz="1100" b="1" dirty="0"/>
+              <a:t>eficaz</a:t>
+            </a:r>
+            <a:r>
+              <a:rPr lang="pt-PT" sz="1100" dirty="0"/>
+              <a:t> de uma aplicação web completa para gestão financeira pessoal.</a:t>
+            </a:r>
+          </a:p>
+          <a:p>
+            <a:pPr marL="171450" indent="-171450" algn="just">
+              <a:buFont typeface="Arial" panose="020B0604020202020204" pitchFamily="34" charset="0"/>
+              <a:buChar char="•"/>
+            </a:pPr>
+            <a:r>
+              <a:rPr lang="pt-PT" sz="1100" dirty="0"/>
+              <a:t>Implementação </a:t>
+            </a:r>
+            <a:r>
+              <a:rPr lang="pt-PT" sz="1100" b="1" dirty="0"/>
+              <a:t>bem-sucedida</a:t>
+            </a:r>
+            <a:r>
+              <a:rPr lang="pt-PT" sz="1100" dirty="0"/>
+              <a:t> de dashboards intuitivos e relatórios financeiros detalhados.</a:t>
+            </a:r>
+          </a:p>
+          <a:p>
+            <a:pPr marL="171450" indent="-171450" algn="just">
+              <a:buFont typeface="Arial" panose="020B0604020202020204" pitchFamily="34" charset="0"/>
+              <a:buChar char="•"/>
+            </a:pPr>
+            <a:r>
+              <a:rPr lang="pt-PT" sz="1100" dirty="0"/>
+              <a:t>Integração de alertas automáticos e personalizáveis para controlo de despesas.</a:t>
+            </a:r>
+          </a:p>
+          <a:p>
+            <a:pPr marL="171450" indent="-171450" algn="just">
+              <a:buFont typeface="Arial" panose="020B0604020202020204" pitchFamily="34" charset="0"/>
+              <a:buChar char="•"/>
+            </a:pPr>
+            <a:r>
+              <a:rPr lang="pt-PT" sz="1100" dirty="0"/>
+              <a:t>Validação positiva em testes de usabilidade, confirmando facilidade e eficiência na utilização da plataforma.</a:t>
+            </a:r>
+          </a:p>
+          <a:p>
+            <a:pPr marL="171450" indent="-171450" algn="just">
+              <a:buFont typeface="Arial" panose="020B0604020202020204" pitchFamily="34" charset="0"/>
+              <a:buChar char="•"/>
+            </a:pPr>
+            <a:r>
+              <a:rPr lang="pt-PT" sz="1100" dirty="0"/>
+              <a:t>Plataforma preparada para expansão, manutenção e integração futura de novas funcionalidades.</a:t>
+            </a:r>
+          </a:p>
+          <a:p>
+            <a:endParaRPr lang="pt-PT" sz="2000" dirty="0">
+              <a:solidFill>
+                <a:srgbClr val="DDAB28"/>
+              </a:solidFill>
+            </a:endParaRPr>
           </a:p>
         </p:txBody>
       </p:sp>
@@ -4394,8 +4804,8 @@
         </p:blipFill>
         <p:spPr>
           <a:xfrm>
-            <a:off x="3088432" y="5880853"/>
-            <a:ext cx="866377" cy="2584592"/>
+            <a:off x="3232448" y="6153683"/>
+            <a:ext cx="772406" cy="2304256"/>
           </a:xfrm>
           <a:prstGeom prst="rect">
             <a:avLst/>
@@ -4430,8 +4840,8 @@
         </p:blipFill>
         <p:spPr>
           <a:xfrm>
-            <a:off x="4929813" y="5073854"/>
-            <a:ext cx="3193436" cy="3203672"/>
+            <a:off x="5266388" y="5736704"/>
+            <a:ext cx="2733973" cy="2742736"/>
           </a:xfrm>
           <a:prstGeom prst="rect">
             <a:avLst/>
@@ -4440,10 +4850,10 @@
       </p:pic>
       <p:pic>
         <p:nvPicPr>
-          <p:cNvPr id="29" name="Imagem 28" descr="Uma imagem com texto, captura de ecrã, diagrama, Gráfico&#10;&#10;Os conteúdos gerados por IA podem estar incorretos.">
+          <p:cNvPr id="4" name="Imagem 3" descr="Uma imagem com texto, captura de ecrã, diagrama, Saturação de cores&#10;&#10;Os conteúdos gerados por IA podem estar incorretos.">
             <a:extLst>
               <a:ext uri="{FF2B5EF4-FFF2-40B4-BE49-F238E27FC236}">
-                <a16:creationId xmlns:a16="http://schemas.microsoft.com/office/drawing/2014/main" id="{1182EE6E-66D3-26D0-505B-1B55981DCB99}"/>
+                <a16:creationId xmlns:a16="http://schemas.microsoft.com/office/drawing/2014/main" id="{C7EDFBBF-9A46-83E2-1014-2CD186582481}"/>
               </a:ext>
             </a:extLst>
           </p:cNvPr>
@@ -4466,44 +4876,8 @@
         </p:blipFill>
         <p:spPr>
           <a:xfrm>
-            <a:off x="9372823" y="3226635"/>
-            <a:ext cx="2566094" cy="3072408"/>
-          </a:xfrm>
-          <a:prstGeom prst="rect">
-            <a:avLst/>
-          </a:prstGeom>
-        </p:spPr>
-      </p:pic>
-      <p:pic>
-        <p:nvPicPr>
-          <p:cNvPr id="31" name="Imagem 30" descr="Uma imagem com texto, captura de ecrã, diagrama, círculo&#10;&#10;Os conteúdos gerados por IA podem estar incorretos.">
-            <a:extLst>
-              <a:ext uri="{FF2B5EF4-FFF2-40B4-BE49-F238E27FC236}">
-                <a16:creationId xmlns:a16="http://schemas.microsoft.com/office/drawing/2014/main" id="{E5C17502-A6FB-87DC-9CCE-0164D3BFB984}"/>
-              </a:ext>
-            </a:extLst>
-          </p:cNvPr>
-          <p:cNvPicPr>
-            <a:picLocks noChangeAspect="1"/>
-          </p:cNvPicPr>
-          <p:nvPr/>
-        </p:nvPicPr>
-        <p:blipFill>
-          <a:blip r:embed="rId10">
-            <a:extLst>
-              <a:ext uri="{28A0092B-C50C-407E-A947-70E740481C1C}">
-                <a14:useLocalDpi xmlns:a14="http://schemas.microsoft.com/office/drawing/2010/main" val="0"/>
-              </a:ext>
-            </a:extLst>
-          </a:blip>
-          <a:stretch>
-            <a:fillRect/>
-          </a:stretch>
-        </p:blipFill>
-        <p:spPr>
-          <a:xfrm>
-            <a:off x="9372538" y="6283199"/>
-            <a:ext cx="2566094" cy="2196241"/>
+            <a:off x="9641160" y="3592834"/>
+            <a:ext cx="2407462" cy="4893389"/>
           </a:xfrm>
           <a:prstGeom prst="rect">
             <a:avLst/>

</xml_diff>